<commit_message>
Notes for the presentation
</commit_message>
<xml_diff>
--- a/Presentation/Processing Data on Air Pollution in Europe on Modern Data Platform.pptx
+++ b/Presentation/Processing Data on Air Pollution in Europe on Modern Data Platform.pptx
@@ -5512,35 +5512,45 @@
           <a:lstStyle/>
           <a:p>
             <a:r>
-              <a:rPr lang="en-US" b="0" i="0" dirty="0">
-                <a:solidFill>
-                  <a:srgbClr val="374151"/>
-                </a:solidFill>
-                <a:effectLst/>
-                <a:latin typeface="Söhne"/>
-              </a:rPr>
-              <a:t>The dataset under examination is the 'StackOverflow2013' database, which spans from the years 2008 to 2013. This comprehensive dataset provides a rich opportunity for various analytical explorations and can offer valuable insights into the trends, patterns, and dynamics of the Stack Overflow community during its early years.</a:t>
-            </a:r>
-          </a:p>
-          <a:p>
-            <a:endParaRPr lang="en-US" dirty="0">
-              <a:solidFill>
-                <a:srgbClr val="374151"/>
-              </a:solidFill>
-              <a:latin typeface="Söhne"/>
-            </a:endParaRPr>
-          </a:p>
-          <a:p>
-            <a:r>
-              <a:rPr lang="en-US" dirty="0">
-                <a:solidFill>
-                  <a:srgbClr val="374151"/>
-                </a:solidFill>
-                <a:latin typeface="Söhne"/>
-              </a:rPr>
-              <a:t>25’’</a:t>
-            </a:r>
-            <a:endParaRPr lang="pl-PL" dirty="0"/>
+              <a:rPr lang="en-US" dirty="0"/>
+              <a:t>Hello everyone,</a:t>
+            </a:r>
+          </a:p>
+          <a:p>
+            <a:endParaRPr lang="en-US" dirty="0"/>
+          </a:p>
+          <a:p>
+            <a:r>
+              <a:rPr lang="en-US" dirty="0"/>
+              <a:t>I would like to present my project titled 'Processing Data on Air Pollution in Europe Using a Modern Data Platform.'</a:t>
+            </a:r>
+          </a:p>
+          <a:p>
+            <a:endParaRPr lang="en-US" dirty="0"/>
+          </a:p>
+          <a:p>
+            <a:r>
+              <a:rPr lang="en-US" dirty="0"/>
+              <a:t>Today's presentation is centered on the significant challenge of air pollution in Europe.</a:t>
+            </a:r>
+          </a:p>
+          <a:p>
+            <a:endParaRPr lang="en-US" dirty="0"/>
+          </a:p>
+          <a:p>
+            <a:r>
+              <a:rPr lang="en-US" dirty="0"/>
+              <a:t>I have dedicated time to exploring how a Modern Data Platform can leverage the vast amounts of air quality data collected by meteorological stations. My aim is to unravel patterns using the technology stack we've used throughout the course.</a:t>
+            </a:r>
+          </a:p>
+          <a:p>
+            <a:endParaRPr lang="en-US" dirty="0"/>
+          </a:p>
+          <a:p>
+            <a:r>
+              <a:rPr lang="en-US" dirty="0"/>
+              <a:t>34’’</a:t>
+            </a:r>
           </a:p>
         </p:txBody>
       </p:sp>
@@ -5646,7 +5656,7 @@
             <a:pPr algn="just"/>
             <a:r>
               <a:rPr lang="en-US" dirty="0"/>
-              <a:t>In this slide, I'm detailing the efficient process of exporting data from SQL Server to CSV and then compressing it for optimal transfer speed.</a:t>
+              <a:t>We're revisiting the 'Storage' step, this time to talk about streaming the processed data into a Delta Table. </a:t>
             </a:r>
           </a:p>
           <a:p>
@@ -5657,7 +5667,7 @@
             <a:pPr algn="just"/>
             <a:r>
               <a:rPr lang="en-US" dirty="0"/>
-              <a:t>I start by using BCP, which stands for Bulk Copy Program, a tool provided by SQL Server. It's the fastest method available to perform large-scale data exports to CSV format, ensuring speed and efficiency. I specify the view names that form the collection of data I wish to export, and then I initiate a loop to process each view individually.</a:t>
+              <a:t>The code shown here handles the streaming process. It's set up to append data to the table in real-time, with checkpoints that maintain the data's integrity.</a:t>
             </a:r>
           </a:p>
           <a:p>
@@ -5668,53 +5678,14 @@
             <a:pPr algn="just"/>
             <a:r>
               <a:rPr lang="en-US" dirty="0"/>
-              <a:t>Once the CSV files are generated, I use 7-Zip to compress them into </a:t>
-            </a:r>
-            <a:r>
-              <a:rPr lang="en-US" dirty="0" err="1"/>
-              <a:t>gzip</a:t>
-            </a:r>
+              <a:t>I've used the Databricks CLI to create a secret scope, which securely manages the storage paths, vital for protecting sensitive information. </a:t>
+            </a:r>
+          </a:p>
+          <a:p>
+            <a:pPr algn="just"/>
             <a:r>
               <a:rPr lang="en-US" dirty="0"/>
-              <a:t> format. One of the key advantages of </a:t>
-            </a:r>
-            <a:r>
-              <a:rPr lang="en-US" dirty="0" err="1"/>
-              <a:t>gzip</a:t>
-            </a:r>
-            <a:r>
-              <a:rPr lang="en-US" dirty="0"/>
-              <a:t> is its compatibility with Databricks' file system. It can read </a:t>
-            </a:r>
-            <a:r>
-              <a:rPr lang="en-US" dirty="0" err="1"/>
-              <a:t>gzip</a:t>
-            </a:r>
-            <a:r>
-              <a:rPr lang="en-US" dirty="0"/>
-              <a:t> files directly, which means there's no need to decompress them on the platform, saving valuable processing time and simplifying the data pipeline.</a:t>
-            </a:r>
-          </a:p>
-          <a:p>
-            <a:pPr algn="just"/>
-            <a:endParaRPr lang="en-US" dirty="0"/>
-          </a:p>
-          <a:p>
-            <a:pPr algn="just"/>
-            <a:r>
-              <a:rPr lang="en-US" dirty="0"/>
-              <a:t>The bottom part of the slide shows the actual script that orchestrates this entire process: from setting environment variables for BCP to executing the compression commands and cleaning up interim files. This script is the backbone of the procedure, handling everything from data extraction to final file compression, ready for sending to Databricks.</a:t>
-            </a:r>
-          </a:p>
-          <a:p>
-            <a:pPr algn="just"/>
-            <a:endParaRPr lang="en-US" dirty="0"/>
-          </a:p>
-          <a:p>
-            <a:pPr algn="just"/>
-            <a:r>
-              <a:rPr lang="en-US" dirty="0"/>
-              <a:t>67’’</a:t>
+              <a:t>25‘’</a:t>
             </a:r>
             <a:endParaRPr lang="pl-PL" dirty="0"/>
           </a:p>
@@ -5828,7 +5799,7 @@
             <a:pPr algn="just"/>
             <a:r>
               <a:rPr lang="en-US" dirty="0"/>
-              <a:t>In this slide, I'm detailing the efficient process of exporting data from SQL Server to CSV and then compressing it for optimal transfer speed.</a:t>
+              <a:t>"In this part of the Processing phase, we're enhancing our dataset with essential reference information. Specifically, I'm loading ISO country codes, which are crucial for data enrichment.</a:t>
             </a:r>
           </a:p>
           <a:p>
@@ -5839,7 +5810,7 @@
             <a:pPr algn="just"/>
             <a:r>
               <a:rPr lang="en-US" dirty="0"/>
-              <a:t>I start by using BCP, which stands for Bulk Copy Program, a tool provided by SQL Server. It's the fastest method available to perform large-scale data exports to CSV format, ensuring speed and efficiency. I specify the view names that form the collection of data I wish to export, and then I initiate a loop to process each view individually.</a:t>
+              <a:t>The code displayed here uses Apache Spark to read a CSV file containing the country codes. The options set within the code ensure that the CSV file is read correctly, considering headers and custom delimiters.</a:t>
             </a:r>
           </a:p>
           <a:p>
@@ -5850,53 +5821,22 @@
             <a:pPr algn="just"/>
             <a:r>
               <a:rPr lang="en-US" dirty="0"/>
-              <a:t>Once the CSV files are generated, I use 7-Zip to compress them into </a:t>
+              <a:t>After loading, I create a temporary view of this data within Spark. This view, '</a:t>
             </a:r>
             <a:r>
               <a:rPr lang="en-US" dirty="0" err="1"/>
-              <a:t>gzip</a:t>
+              <a:t>CountriesIso</a:t>
             </a:r>
             <a:r>
               <a:rPr lang="en-US" dirty="0"/>
-              <a:t> format. One of the key advantages of </a:t>
-            </a:r>
-            <a:r>
-              <a:rPr lang="en-US" dirty="0" err="1"/>
-              <a:t>gzip</a:t>
-            </a:r>
+              <a:t>', allows me to efficiently join the country codes with our main dataset, enriching it with standardized country information.</a:t>
+            </a:r>
+          </a:p>
+          <a:p>
+            <a:pPr algn="just"/>
             <a:r>
               <a:rPr lang="en-US" dirty="0"/>
-              <a:t> is its compatibility with Databricks' file system. It can read </a:t>
-            </a:r>
-            <a:r>
-              <a:rPr lang="en-US" dirty="0" err="1"/>
-              <a:t>gzip</a:t>
-            </a:r>
-            <a:r>
-              <a:rPr lang="en-US" dirty="0"/>
-              <a:t> files directly, which means there's no need to decompress them on the platform, saving valuable processing time and simplifying the data pipeline.</a:t>
-            </a:r>
-          </a:p>
-          <a:p>
-            <a:pPr algn="just"/>
-            <a:endParaRPr lang="en-US" dirty="0"/>
-          </a:p>
-          <a:p>
-            <a:pPr algn="just"/>
-            <a:r>
-              <a:rPr lang="en-US" dirty="0"/>
-              <a:t>The bottom part of the slide shows the actual script that orchestrates this entire process: from setting environment variables for BCP to executing the compression commands and cleaning up interim files. This script is the backbone of the procedure, handling everything from data extraction to final file compression, ready for sending to Databricks.</a:t>
-            </a:r>
-          </a:p>
-          <a:p>
-            <a:pPr algn="just"/>
-            <a:endParaRPr lang="en-US" dirty="0"/>
-          </a:p>
-          <a:p>
-            <a:pPr algn="just"/>
-            <a:r>
-              <a:rPr lang="en-US" dirty="0"/>
-              <a:t>67’’</a:t>
+              <a:t>39‘’</a:t>
             </a:r>
             <a:endParaRPr lang="pl-PL" dirty="0"/>
           </a:p>
@@ -5992,7 +5932,7 @@
             <a:pPr algn="just"/>
             <a:r>
               <a:rPr lang="en-US" dirty="0"/>
-              <a:t>In this part of the presentation, I'm focusing on the data source that I used for the analysis. I have chosen the Stack Overflow database for a few key reasons:</a:t>
+              <a:t>In my analysis phase, I’ve focused on identifying countries with the highest levels of PM10 pollution. Using Spark SQL, I've executed a query to calculate the average PM10 values by country, leveraging the data stored in the Delta table.</a:t>
             </a:r>
           </a:p>
           <a:p>
@@ -6003,7 +5943,7 @@
             <a:pPr algn="just"/>
             <a:r>
               <a:rPr lang="en-US" dirty="0"/>
-              <a:t>Firstly, this database is derived from the public Stack Overflow data export, which is a rich dataset used widely in the tech community for analysis and training. It's not just a  simple dataset; it reflects real-world distributions of numbers, dates, and strings, making it an excellent candidate for realistic data analysis scenarios.</a:t>
+              <a:t>The result of this query is displayed in the bar chart here, which has been integrated into the web application deployed on Azure App Services. This visualization clearly shows the varying levels of PM10 across different European countries, with the Southern Countries having the highest average levels in this particular dataset.</a:t>
             </a:r>
           </a:p>
           <a:p>
@@ -6014,35 +5954,14 @@
             <a:pPr algn="just"/>
             <a:r>
               <a:rPr lang="en-US" dirty="0"/>
-              <a:t>For my purposes, I've selected the medium option – the 50GB StackOverflow2013 database, which expands from a 10GB compressed file. This particular dataset contains data from 2008 to 2013.</a:t>
+              <a:t>It's important to note that the data for this chart is sourced from the serving layer, which I will show in the next slides. I've decided to maintain consistency in my presentation by focusing on the analytical outcomes before delving into the architectural details of the serving layer.</a:t>
             </a:r>
           </a:p>
           <a:p>
             <a:pPr algn="just"/>
-            <a:endParaRPr lang="en-US" dirty="0"/>
-          </a:p>
-          <a:p>
-            <a:pPr algn="just"/>
             <a:r>
               <a:rPr lang="en-US" dirty="0"/>
-              <a:t>The data comes in the form of .</a:t>
-            </a:r>
-            <a:r>
-              <a:rPr lang="en-US" dirty="0" err="1"/>
-              <a:t>mdf</a:t>
-            </a:r>
-            <a:r>
-              <a:rPr lang="en-US" dirty="0"/>
-              <a:t> files, which are the primary database file types used by SQL Server. This makes it convenient as they can be attached directly to SQL Server without any additional conversion, saving time and simplifying the setup process.</a:t>
-            </a:r>
-          </a:p>
-          <a:p>
-            <a:endParaRPr lang="en-US" dirty="0"/>
-          </a:p>
-          <a:p>
-            <a:r>
-              <a:rPr lang="en-US" dirty="0"/>
-              <a:t>68’’</a:t>
+              <a:t>‘’</a:t>
             </a:r>
             <a:endParaRPr lang="pl-PL" dirty="0"/>
           </a:p>
@@ -6150,7 +6069,7 @@
             <a:pPr algn="just"/>
             <a:r>
               <a:rPr lang="en-US" dirty="0"/>
-              <a:t>In this part of the presentation, I'm focusing on the data source that I used for the analysis. I have chosen the Stack Overflow database for a few key reasons:</a:t>
+              <a:t>Here, I am examining the correlation between weather conditions and air pollution levels. The Pearson correlation coefficient is a statistical measure that I use to understand the strength of the relationship between two variables, ranging between -1 and 1.</a:t>
             </a:r>
           </a:p>
           <a:p>
@@ -6161,7 +6080,7 @@
             <a:pPr algn="just"/>
             <a:r>
               <a:rPr lang="en-US" dirty="0"/>
-              <a:t>Firstly, this database is derived from the public Stack Overflow data export, which is a rich dataset used widely in the tech community for analysis and training. It's not just a  simple dataset; it reflects real-world distributions of numbers, dates, and strings, making it an excellent candidate for realistic data analysis scenarios.</a:t>
+              <a:t>For this analysis, I calculated the absolute values of the Pearson coefficients to illustrate the strength of correlations more effectively on our visualization.</a:t>
             </a:r>
           </a:p>
           <a:p>
@@ -6172,35 +6091,14 @@
             <a:pPr algn="just"/>
             <a:r>
               <a:rPr lang="en-US" dirty="0"/>
-              <a:t>For my purposes, I've selected the medium option – the 50GB StackOverflow2013 database, which expands from a 10GB compressed file. This particular dataset contains data from 2008 to 2013.</a:t>
+              <a:t>The bubble plot you see here represents these correlations. For instance, we can observe whether higher temperatures correspond to higher levels of certain pollutants. This allows us to identify which weather factors are most closely associated with air pollution levels.</a:t>
             </a:r>
           </a:p>
           <a:p>
             <a:pPr algn="just"/>
-            <a:endParaRPr lang="en-US" dirty="0"/>
-          </a:p>
-          <a:p>
-            <a:pPr algn="just"/>
             <a:r>
               <a:rPr lang="en-US" dirty="0"/>
-              <a:t>The data comes in the form of .</a:t>
-            </a:r>
-            <a:r>
-              <a:rPr lang="en-US" dirty="0" err="1"/>
-              <a:t>mdf</a:t>
-            </a:r>
-            <a:r>
-              <a:rPr lang="en-US" dirty="0"/>
-              <a:t> files, which are the primary database file types used by SQL Server. This makes it convenient as they can be attached directly to SQL Server without any additional conversion, saving time and simplifying the setup process.</a:t>
-            </a:r>
-          </a:p>
-          <a:p>
-            <a:endParaRPr lang="en-US" dirty="0"/>
-          </a:p>
-          <a:p>
-            <a:r>
-              <a:rPr lang="en-US" dirty="0"/>
-              <a:t>68’’</a:t>
+              <a:t>42‘’</a:t>
             </a:r>
             <a:endParaRPr lang="pl-PL" dirty="0"/>
           </a:p>
@@ -6314,7 +6212,15 @@
             <a:pPr algn="just"/>
             <a:r>
               <a:rPr lang="en-US" dirty="0"/>
-              <a:t>In this part of the presentation, I'm focusing on the data source that I used for the analysis. I have chosen the Stack Overflow database for a few key reasons:</a:t>
+              <a:t>In this segment of my  </a:t>
+            </a:r>
+            <a:r>
+              <a:rPr lang="en-US" dirty="0" err="1"/>
+              <a:t>nalysis</a:t>
+            </a:r>
+            <a:r>
+              <a:rPr lang="en-US" dirty="0"/>
+              <a:t>, I am pinpointing capital cities with the most significant traffic pollution, as indicated by levels of nitrogen dioxide, or NO2.</a:t>
             </a:r>
           </a:p>
           <a:p>
@@ -6325,7 +6231,7 @@
             <a:pPr algn="just"/>
             <a:r>
               <a:rPr lang="en-US" dirty="0"/>
-              <a:t>Firstly, this database is derived from the public Stack Overflow data export, which is a rich dataset used widely in the tech community for analysis and training. It's not just a  simple dataset; it reflects real-world distributions of numbers, dates, and strings, making it an excellent candidate for realistic data analysis scenarios.</a:t>
+              <a:t>I've written a Spark SQL query that calculates the average NO2 concentrations by capital city. The query joins the pollution data with a list of capitals, considering their geographical coordinates to ensure accurate location matching.</a:t>
             </a:r>
           </a:p>
           <a:p>
@@ -6336,35 +6242,14 @@
             <a:pPr algn="just"/>
             <a:r>
               <a:rPr lang="en-US" dirty="0"/>
-              <a:t>For my purposes, I've selected the medium option – the 50GB StackOverflow2013 database, which expands from a 10GB compressed file. This particular dataset contains data from 2008 to 2013.</a:t>
+              <a:t>The resulting bar chart, which is displayed on our Azure App Services-deployed web application, visualizes the NO2 pollution levels. It reveals that Moscow, Luxembourg, and Rome are currently the cities with the highest average NO2.</a:t>
             </a:r>
           </a:p>
           <a:p>
             <a:pPr algn="just"/>
-            <a:endParaRPr lang="en-US" dirty="0"/>
-          </a:p>
-          <a:p>
-            <a:pPr algn="just"/>
             <a:r>
               <a:rPr lang="en-US" dirty="0"/>
-              <a:t>The data comes in the form of .</a:t>
-            </a:r>
-            <a:r>
-              <a:rPr lang="en-US" dirty="0" err="1"/>
-              <a:t>mdf</a:t>
-            </a:r>
-            <a:r>
-              <a:rPr lang="en-US" dirty="0"/>
-              <a:t> files, which are the primary database file types used by SQL Server. This makes it convenient as they can be attached directly to SQL Server without any additional conversion, saving time and simplifying the setup process.</a:t>
-            </a:r>
-          </a:p>
-          <a:p>
-            <a:endParaRPr lang="en-US" dirty="0"/>
-          </a:p>
-          <a:p>
-            <a:r>
-              <a:rPr lang="en-US" dirty="0"/>
-              <a:t>68’’</a:t>
+              <a:t>‘’</a:t>
             </a:r>
             <a:endParaRPr lang="pl-PL" dirty="0"/>
           </a:p>
@@ -6459,7 +6344,7 @@
           <a:p>
             <a:r>
               <a:rPr lang="en-US" dirty="0"/>
-              <a:t>On this slide, I present the crucial step in data preparation: Data Cleaning. The main challenge I faced was the presence of HTML code within the text fields. This code caused problems in export procedures.</a:t>
+              <a:t>As part of my analysis, I've visualized the distribution of various pollutants across Europe, focusing on PM10 concentrations. The heatmap we see here was created using the Python Folium library, which is excellent for geographic data visualization.</a:t>
             </a:r>
           </a:p>
           <a:p>
@@ -6468,7 +6353,7 @@
           <a:p>
             <a:r>
               <a:rPr lang="en-US" dirty="0"/>
-              <a:t>To address this, I implemented a data cleaning process through the creation of database views. These views serve a specific purpose: they remove unnecessary carriage return (\r) and newline (\n) characters from text fields. Additionally, to align with the objective of converting the data into CSV format, I needed to ensure that each text field is properly quoted.</a:t>
+              <a:t>The code snippet above transforms our data, rounding latitude and longitude to one decimal place to consolidate measurements into geographic grid points. Then, it aggregates the data to calculate average PM10 values for these points.</a:t>
             </a:r>
           </a:p>
           <a:p>
@@ -6477,16 +6362,13 @@
           <a:p>
             <a:r>
               <a:rPr lang="en-US" dirty="0"/>
-              <a:t>The SQL script you see performs this transformation seamlessly. By wrapping the text fields with quotes and stripping out unwanted characters, I make the data CSV-ready. This step was not only necessary but also the most efficient route to prepare the text fields for the conversion process.</a:t>
-            </a:r>
-          </a:p>
-          <a:p>
-            <a:endParaRPr lang="en-US" dirty="0"/>
+              <a:t>The result is this compelling heatmap. It highlights the areas with higher pollution levels in a more intense color, offering an immediate visual understanding of pollution distribution, which can be vital for environmental planning and policy-making.</a:t>
+            </a:r>
           </a:p>
           <a:p>
             <a:r>
               <a:rPr lang="en-US" dirty="0"/>
-              <a:t>60’’</a:t>
+              <a:t>41‘’</a:t>
             </a:r>
             <a:endParaRPr lang="pl-PL" dirty="0"/>
           </a:p>
@@ -6586,14 +6468,19 @@
             <p:ph type="body" idx="1"/>
           </p:nvPr>
         </p:nvSpPr>
-        <p:spPr/>
+        <p:spPr>
+          <a:xfrm>
+            <a:off x="685800" y="4400550"/>
+            <a:ext cx="5486400" cy="4103370"/>
+          </a:xfrm>
+        </p:spPr>
         <p:txBody>
           <a:bodyPr/>
           <a:lstStyle/>
           <a:p>
             <a:r>
               <a:rPr lang="en-US" dirty="0"/>
-              <a:t>On this slide, I present the crucial step in data preparation: Data Cleaning. The main challenge I faced was the presence of HTML code within the text fields. This code caused problems in export procedures.</a:t>
+              <a:t>We've now reached the Serving Layer of the modern data platform, where I use the Azure SQL Database. This critical layer is where our processed data becomes readily accessible for querying and visualization.</a:t>
             </a:r>
           </a:p>
           <a:p>
@@ -6602,7 +6489,7 @@
           <a:p>
             <a:r>
               <a:rPr lang="en-US" dirty="0"/>
-              <a:t>To address this, I implemented a data cleaning process through the creation of database views. These views serve a specific purpose: they remove unnecessary carriage return (\r) and newline (\n) characters from text fields. Additionally, to align with the objective of converting the data into CSV format, I needed to ensure that each text field is properly quoted.</a:t>
+              <a:t>The code snippets here demonstrate two key operations:</a:t>
             </a:r>
           </a:p>
           <a:p>
@@ -6611,7 +6498,7 @@
           <a:p>
             <a:r>
               <a:rPr lang="en-US" dirty="0"/>
-              <a:t>The SQL script you see performs this transformation seamlessly. By wrapping the text fields with quotes and stripping out unwanted characters, I make the data CSV-ready. This step was not only necessary but also the most efficient route to prepare the text fields for the conversion process.</a:t>
+              <a:t>First, I establish a secure connection to the Azure SQL Database, utilizing properties, retrieved from the secure Databricks scope .</a:t>
             </a:r>
           </a:p>
           <a:p>
@@ -6620,7 +6507,40 @@
           <a:p>
             <a:r>
               <a:rPr lang="en-US" dirty="0"/>
-              <a:t>60’’</a:t>
+              <a:t>Next, I ensure our tables are cleared for new data with the TRUNCATE TABLE SQL command, preparing the database for updated entries.</a:t>
+            </a:r>
+          </a:p>
+          <a:p>
+            <a:endParaRPr lang="en-US" dirty="0"/>
+          </a:p>
+          <a:p>
+            <a:r>
+              <a:rPr lang="en-US" dirty="0"/>
+              <a:t>Then, we have the data loading process, where Spark writes the transformed and analyzed data into the SQL tables. </a:t>
+            </a:r>
+          </a:p>
+          <a:p>
+            <a:endParaRPr lang="en-US" dirty="0"/>
+          </a:p>
+          <a:p>
+            <a:r>
+              <a:rPr lang="en-US" dirty="0"/>
+              <a:t>On the right, you see the Azure portal's interface, displaying the SQL database with its tables—ready for any applications connected to it.</a:t>
+            </a:r>
+          </a:p>
+          <a:p>
+            <a:endParaRPr lang="en-US" dirty="0"/>
+          </a:p>
+          <a:p>
+            <a:r>
+              <a:rPr lang="en-US" dirty="0"/>
+              <a:t>This setup exemplifies how a cloud database can serve as a robust foundation as a service layer.</a:t>
+            </a:r>
+          </a:p>
+          <a:p>
+            <a:r>
+              <a:rPr lang="en-US" dirty="0"/>
+              <a:t>57‘’</a:t>
             </a:r>
             <a:endParaRPr lang="pl-PL" dirty="0"/>
           </a:p>
@@ -6733,7 +6653,7 @@
           <a:p>
             <a:r>
               <a:rPr lang="en-US" dirty="0"/>
-              <a:t>On this slide, I present the crucial step in data preparation: Data Cleaning. The main challenge I faced was the presence of HTML code within the text fields. This code caused problems in export procedures.</a:t>
+              <a:t>Within the service layer, a crucial element is our Python application, designed to enhance user interaction and insight generation. This application leverages two powerful libraries: Matplotlib and Folium.</a:t>
             </a:r>
           </a:p>
           <a:p>
@@ -6742,7 +6662,7 @@
           <a:p>
             <a:r>
               <a:rPr lang="en-US" dirty="0"/>
-              <a:t>To address this, I implemented a data cleaning process through the creation of database views. These views serve a specific purpose: they remove unnecessary carriage return (\r) and newline (\n) characters from text fields. Additionally, to align with the objective of converting the data into CSV format, I needed to ensure that each text field is properly quoted.</a:t>
+              <a:t>Matplotlib enables us to generate insightful visualizations, such as line plots, bar charts, and scatter plots, directly within our application. </a:t>
             </a:r>
           </a:p>
           <a:p>
@@ -6751,7 +6671,7 @@
           <a:p>
             <a:r>
               <a:rPr lang="en-US" dirty="0"/>
-              <a:t>The SQL script you see performs this transformation seamlessly. By wrapping the text fields with quotes and stripping out unwanted characters, I make the data CSV-ready. This step was not only necessary but also the most efficient route to prepare the text fields for the conversion process.</a:t>
+              <a:t>Additionally, I use the Folium library to create interactive maps, as mentioned previously.</a:t>
             </a:r>
           </a:p>
           <a:p>
@@ -6760,7 +6680,13 @@
           <a:p>
             <a:r>
               <a:rPr lang="en-US" dirty="0"/>
-              <a:t>60’’</a:t>
+              <a:t>Summarizing, besides initiation of the pipeline, the Python application delivers comprehensive insights, combining statistical analysis with visual representation.</a:t>
+            </a:r>
+          </a:p>
+          <a:p>
+            <a:r>
+              <a:rPr lang="en-US" dirty="0"/>
+              <a:t>39’’</a:t>
             </a:r>
             <a:endParaRPr lang="pl-PL" dirty="0"/>
           </a:p>
@@ -6848,43 +6774,95 @@
             <p:ph type="body" idx="1"/>
           </p:nvPr>
         </p:nvSpPr>
-        <p:spPr/>
+        <p:spPr>
+          <a:xfrm>
+            <a:off x="685800" y="4400550"/>
+            <a:ext cx="5486400" cy="4203700"/>
+          </a:xfrm>
+        </p:spPr>
         <p:txBody>
           <a:bodyPr/>
           <a:lstStyle/>
           <a:p>
             <a:pPr algn="just"/>
-            <a:endParaRPr lang="en-US" dirty="0"/>
+            <a:r>
+              <a:rPr lang="en-US" sz="1100" dirty="0"/>
+              <a:t>Concluding the presentation, let's reflect on the key findings and suggestions for improvement.</a:t>
+            </a:r>
           </a:p>
           <a:p>
             <a:pPr algn="just"/>
-            <a:r>
-              <a:rPr lang="en-US" dirty="0"/>
-              <a:t>This slide summarizes the key findings from the analysis. The most significant observation is that the bulk of the time was spent on cleaning the data, which underscores the importance of having clean data for accurate analysis. I noted that Spark was highly efficient in handling Parquet files, though it’s crucial to provide the correct schema upfront to ensure smooth processing.</a:t>
-            </a:r>
+            <a:endParaRPr lang="en-US" sz="1100" dirty="0"/>
           </a:p>
           <a:p>
             <a:pPr algn="just"/>
-            <a:endParaRPr lang="en-US" dirty="0"/>
+            <a:r>
+              <a:rPr lang="en-US" sz="1100" dirty="0"/>
+              <a:t>First, my analysis has revealed that Southern Europe has the most polluted air—a sobering realization that underscores the urgent need for targeted interventions in this region.</a:t>
+            </a:r>
           </a:p>
           <a:p>
             <a:pPr algn="just"/>
-            <a:r>
-              <a:rPr lang="en-US" dirty="0"/>
-              <a:t>Another point of interest is the observation that using regular expressions proved to be quite slow, which suggests the need for more efficient text processing methods in future analyses. Lastly, considering the overall data pipeline performance, deploying a database on Azure SQL Database and connecting it directly to Databricks could offer a more streamlined and faster approach. </a:t>
-            </a:r>
+            <a:endParaRPr lang="en-US" sz="1100" dirty="0"/>
           </a:p>
           <a:p>
             <a:pPr algn="just"/>
-            <a:endParaRPr lang="en-US" dirty="0"/>
+            <a:r>
+              <a:rPr lang="en-US" sz="1100" dirty="0"/>
+              <a:t>Data Processing in Spark was very fast and efficient, enabling me to handle large volumes of data with remarkable speed.</a:t>
+            </a:r>
           </a:p>
           <a:p>
             <a:pPr algn="just"/>
-            <a:r>
-              <a:rPr lang="en-US" dirty="0"/>
-              <a:t>42’’</a:t>
-            </a:r>
-            <a:endParaRPr lang="pl-PL" dirty="0"/>
+            <a:endParaRPr lang="en-US" sz="1100" dirty="0"/>
+          </a:p>
+          <a:p>
+            <a:pPr algn="just"/>
+            <a:r>
+              <a:rPr lang="en-US" sz="1100" dirty="0"/>
+              <a:t>However, it's crucial to note that the analysis was limited to a subset of the available data. A more comprehensive analysis could yield a broader range of insights and potentially uncover hidden patterns and trends.</a:t>
+            </a:r>
+          </a:p>
+          <a:p>
+            <a:pPr algn="just"/>
+            <a:endParaRPr lang="en-US" sz="1100" dirty="0"/>
+          </a:p>
+          <a:p>
+            <a:pPr algn="just"/>
+            <a:r>
+              <a:rPr lang="en-US" sz="1100" dirty="0"/>
+              <a:t>Furthermore, I want to highlight the importance of historical data, which was not analyzed in this study. Comparing our findings with past records could provide valuable context and a deeper understanding.</a:t>
+            </a:r>
+          </a:p>
+          <a:p>
+            <a:pPr algn="just"/>
+            <a:endParaRPr lang="en-US" sz="1100" dirty="0"/>
+          </a:p>
+          <a:p>
+            <a:pPr algn="just"/>
+            <a:r>
+              <a:rPr lang="en-US" sz="1100" dirty="0"/>
+              <a:t>Lastly, I recommend the adoption of specialized tools like Tableau. Such platforms offer advanced features and capabilities that can elevate the analysis.</a:t>
+            </a:r>
+          </a:p>
+          <a:p>
+            <a:pPr algn="just"/>
+            <a:endParaRPr lang="en-US" sz="1100" dirty="0"/>
+          </a:p>
+          <a:p>
+            <a:pPr algn="just"/>
+            <a:r>
+              <a:rPr lang="en-US" sz="1100" dirty="0"/>
+              <a:t>In conclusion, while  my analysis has yielded valuable insights, there remains significant scope for further investigation and improvement. Thank you.</a:t>
+            </a:r>
+          </a:p>
+          <a:p>
+            <a:pPr algn="just"/>
+            <a:r>
+              <a:rPr lang="en-US" sz="1100" dirty="0"/>
+              <a:t>44’’</a:t>
+            </a:r>
+            <a:endParaRPr lang="pl-PL" sz="1100" dirty="0"/>
           </a:p>
         </p:txBody>
       </p:sp>
@@ -6969,51 +6947,45 @@
           <a:bodyPr/>
           <a:lstStyle/>
           <a:p>
-            <a:pPr algn="just"/>
             <a:r>
               <a:rPr lang="en-US" dirty="0"/>
-              <a:t>In this part of the presentation, I'm focusing on the data source that I used for the analysis. I have chosen the Stack Overflow database for a few key reasons:</a:t>
-            </a:r>
-          </a:p>
-          <a:p>
-            <a:pPr algn="just"/>
+              <a:t>Let’s address a serious concern: air pollution. It’s more than just a local environmental issue; it’s a health hazard on a global scale. With data from meteorological stations worldwide, the question is, how do we use it to identify high-risk areas for air quality?</a:t>
+            </a:r>
+          </a:p>
+          <a:p>
             <a:endParaRPr lang="en-US" dirty="0"/>
           </a:p>
           <a:p>
-            <a:pPr algn="just"/>
             <a:r>
               <a:rPr lang="en-US" dirty="0"/>
-              <a:t>Firstly, this database is derived from the public Stack Overflow data export, which is a rich dataset used widely in the tech community for analysis and training. It's not just a  simple dataset; it reflects real-world distributions of numbers, dates, and strings, making it an excellent candidate for realistic data analysis scenarios.</a:t>
-            </a:r>
-          </a:p>
-          <a:p>
-            <a:pPr algn="just"/>
+              <a:t>Key pollutants to monitor include:</a:t>
+            </a:r>
+          </a:p>
+          <a:p>
             <a:endParaRPr lang="en-US" dirty="0"/>
           </a:p>
           <a:p>
-            <a:pPr algn="just"/>
             <a:r>
               <a:rPr lang="en-US" dirty="0"/>
-              <a:t>For my purposes, I've selected the medium option – the 50GB StackOverflow2013 database, which expands from a 10GB compressed file. This particular dataset contains data from 2008 to 2013.</a:t>
-            </a:r>
-          </a:p>
-          <a:p>
-            <a:pPr algn="just"/>
+              <a:t>Particulate matter (PM2.5 and PM10) that invade our respiratory system.</a:t>
+            </a:r>
+          </a:p>
+          <a:p>
             <a:endParaRPr lang="en-US" dirty="0"/>
           </a:p>
           <a:p>
-            <a:pPr algn="just"/>
             <a:r>
               <a:rPr lang="en-US" dirty="0"/>
-              <a:t>The data comes in the form of .</a:t>
-            </a:r>
-            <a:r>
-              <a:rPr lang="en-US" dirty="0" err="1"/>
-              <a:t>mdf</a:t>
-            </a:r>
+              <a:t>Nitrogen and Sulphur oxides (NOx and SO2), the culprits behind smog and acid rain.</a:t>
+            </a:r>
+          </a:p>
+          <a:p>
+            <a:endParaRPr lang="en-US" dirty="0"/>
+          </a:p>
+          <a:p>
             <a:r>
               <a:rPr lang="en-US" dirty="0"/>
-              <a:t> files, which are the primary database file types used by SQL Server. This makes it convenient as they can be attached directly to SQL Server without any additional conversion, saving time and simplifying the setup process.</a:t>
+              <a:t>Carbon monoxide (CO), a deadly gas from incomplete fuel burning.</a:t>
             </a:r>
           </a:p>
           <a:p>
@@ -7022,9 +6994,29 @@
           <a:p>
             <a:r>
               <a:rPr lang="en-US" dirty="0"/>
-              <a:t>68’’</a:t>
-            </a:r>
-            <a:endParaRPr lang="pl-PL" dirty="0"/>
+              <a:t>Ammonia (NH3) from farms and factories, and</a:t>
+            </a:r>
+          </a:p>
+          <a:p>
+            <a:endParaRPr lang="en-US" dirty="0"/>
+          </a:p>
+          <a:p>
+            <a:r>
+              <a:rPr lang="en-US" dirty="0"/>
+              <a:t>Ground-level ozone (O3), formed by sunlight-driven chemical reactions.</a:t>
+            </a:r>
+          </a:p>
+          <a:p>
+            <a:r>
+              <a:rPr lang="en-US" dirty="0"/>
+              <a:t>Recognizing and measuring these pollutants is crucial for our health and environment.</a:t>
+            </a:r>
+          </a:p>
+          <a:p>
+            <a:r>
+              <a:rPr lang="en-US" dirty="0"/>
+              <a:t>51’’</a:t>
+            </a:r>
           </a:p>
         </p:txBody>
       </p:sp>
@@ -7109,62 +7101,64 @@
           <a:bodyPr/>
           <a:lstStyle/>
           <a:p>
-            <a:pPr algn="just"/>
-            <a:r>
-              <a:rPr lang="en-US" dirty="0"/>
-              <a:t>In this part of the presentation, I'm focusing on the data source that I used for the analysis. I have chosen the Stack Overflow database for a few key reasons:</a:t>
-            </a:r>
-          </a:p>
-          <a:p>
-            <a:pPr algn="just"/>
-            <a:endParaRPr lang="en-US" dirty="0"/>
-          </a:p>
-          <a:p>
-            <a:pPr algn="just"/>
-            <a:r>
-              <a:rPr lang="en-US" dirty="0"/>
-              <a:t>Firstly, this database is derived from the public Stack Overflow data export, which is a rich dataset used widely in the tech community for analysis and training. It's not just a  simple dataset; it reflects real-world distributions of numbers, dates, and strings, making it an excellent candidate for realistic data analysis scenarios.</a:t>
-            </a:r>
-          </a:p>
-          <a:p>
-            <a:pPr algn="just"/>
-            <a:endParaRPr lang="en-US" dirty="0"/>
-          </a:p>
-          <a:p>
-            <a:pPr algn="just"/>
-            <a:r>
-              <a:rPr lang="en-US" dirty="0"/>
-              <a:t>For my purposes, I've selected the medium option – the 50GB StackOverflow2013 database, which expands from a 10GB compressed file. This particular dataset contains data from 2008 to 2013.</a:t>
-            </a:r>
-          </a:p>
-          <a:p>
-            <a:pPr algn="just"/>
-            <a:endParaRPr lang="en-US" dirty="0"/>
-          </a:p>
-          <a:p>
-            <a:pPr algn="just"/>
-            <a:r>
-              <a:rPr lang="en-US" dirty="0"/>
-              <a:t>The data comes in the form of .</a:t>
-            </a:r>
-            <a:r>
-              <a:rPr lang="en-US" dirty="0" err="1"/>
-              <a:t>mdf</a:t>
-            </a:r>
-            <a:r>
-              <a:rPr lang="en-US" dirty="0"/>
-              <a:t> files, which are the primary database file types used by SQL Server. This makes it convenient as they can be attached directly to SQL Server without any additional conversion, saving time and simplifying the setup process.</a:t>
-            </a:r>
-          </a:p>
-          <a:p>
-            <a:endParaRPr lang="en-US" dirty="0"/>
-          </a:p>
-          <a:p>
-            <a:r>
-              <a:rPr lang="en-US" dirty="0"/>
-              <a:t>68’’</a:t>
-            </a:r>
-            <a:endParaRPr lang="pl-PL" dirty="0"/>
+            <a:pPr algn="l"/>
+            <a:r>
+              <a:rPr lang="en-US" b="0" i="0" dirty="0">
+                <a:effectLst/>
+                <a:latin typeface="Söhne"/>
+              </a:rPr>
+              <a:t>Moving forward, let's talk about the primary data source for this project: the Open Weather API. This platform provides students, like us, with developer access, offering real-time weather forecasts, historical data, and current conditions through a sleek and efficient interface.</a:t>
+            </a:r>
+          </a:p>
+          <a:p>
+            <a:pPr algn="l"/>
+            <a:endParaRPr lang="en-US" b="0" i="0" dirty="0">
+              <a:effectLst/>
+              <a:latin typeface="Söhne"/>
+            </a:endParaRPr>
+          </a:p>
+          <a:p>
+            <a:pPr algn="l"/>
+            <a:r>
+              <a:rPr lang="en-US" b="0" i="0" dirty="0">
+                <a:effectLst/>
+                <a:latin typeface="Söhne"/>
+              </a:rPr>
+              <a:t>Specifically, I’ve utilized data from two distinct REST API endpoints: one for weather data and the other for pollution data. To give you a practical example, I've pulled live data for Warsaw, Poland—where I'm currently based. Here, you can see current weather conditions alongside pollution levels.</a:t>
+            </a:r>
+          </a:p>
+          <a:p>
+            <a:pPr algn="l"/>
+            <a:endParaRPr lang="en-US" b="0" i="0" dirty="0">
+              <a:effectLst/>
+              <a:latin typeface="Söhne"/>
+            </a:endParaRPr>
+          </a:p>
+          <a:p>
+            <a:pPr algn="l"/>
+            <a:r>
+              <a:rPr lang="en-US" b="0" i="0" dirty="0">
+                <a:effectLst/>
+                <a:latin typeface="Söhne"/>
+              </a:rPr>
+              <a:t>This API is crucial for gathering timely and accurate environmental data, which is the backbone of my analysis. Such detailed information allows us to not only track weather patterns but also monitor air quality in real-time, providing a rich dataset for our study.</a:t>
+            </a:r>
+          </a:p>
+          <a:p>
+            <a:pPr algn="l"/>
+            <a:endParaRPr lang="en-US" dirty="0">
+              <a:latin typeface="Söhne"/>
+            </a:endParaRPr>
+          </a:p>
+          <a:p>
+            <a:pPr algn="l"/>
+            <a:r>
+              <a:rPr lang="en-US" b="0" i="0" dirty="0">
+                <a:effectLst/>
+                <a:latin typeface="Söhne"/>
+              </a:rPr>
+              <a:t>62’’</a:t>
+            </a:r>
           </a:p>
         </p:txBody>
       </p:sp>
@@ -7250,99 +7244,87 @@
           <a:lstStyle/>
           <a:p>
             <a:r>
-              <a:rPr lang="en-US" sz="1100" dirty="0"/>
-              <a:t>The slide shows how the whole project looked like.</a:t>
-            </a:r>
-          </a:p>
-          <a:p>
-            <a:endParaRPr lang="en-US" sz="1100" dirty="0"/>
-          </a:p>
-          <a:p>
-            <a:r>
-              <a:rPr lang="en-US" sz="1100" dirty="0"/>
-              <a:t>I began by downloading the database and establishing a connection to SQL Server, by attaching the downloaded database, laying the groundwork for the subsequent stages.</a:t>
-            </a:r>
-          </a:p>
-          <a:p>
-            <a:endParaRPr lang="en-US" sz="1100" dirty="0"/>
-          </a:p>
-          <a:p>
-            <a:r>
-              <a:rPr lang="en-US" sz="1100" dirty="0"/>
-              <a:t>I then conducted data cleaning, ensuring the data types were correct and identifying any issues. This step was crucial for proper conversion to CSV.</a:t>
-            </a:r>
-          </a:p>
-          <a:p>
-            <a:endParaRPr lang="en-US" sz="1100" dirty="0"/>
-          </a:p>
-          <a:p>
-            <a:r>
-              <a:rPr lang="en-US" sz="1100" dirty="0"/>
-              <a:t>Using BCP from command line, I converted the data into a CSV format.</a:t>
-            </a:r>
-          </a:p>
-          <a:p>
-            <a:endParaRPr lang="en-US" sz="1100" dirty="0"/>
-          </a:p>
-          <a:p>
-            <a:r>
-              <a:rPr lang="en-US" sz="1100" dirty="0"/>
-              <a:t>I compressed the data into </a:t>
-            </a:r>
-            <a:r>
-              <a:rPr lang="en-US" sz="1100" dirty="0" err="1"/>
-              <a:t>gzip</a:t>
-            </a:r>
-            <a:r>
-              <a:rPr lang="en-US" sz="1100" dirty="0"/>
-              <a:t> format to make it smaller, which saves time when sending the data to Databricks.</a:t>
-            </a:r>
-          </a:p>
-          <a:p>
-            <a:endParaRPr lang="en-US" sz="1100" dirty="0"/>
-          </a:p>
-          <a:p>
-            <a:r>
-              <a:rPr lang="en-US" sz="1100" dirty="0"/>
-              <a:t>To streamline the workflow, I set up a Docker container with Databricks CLI, simplifying the transfer of everything to Databricks.</a:t>
-            </a:r>
-          </a:p>
-          <a:p>
-            <a:endParaRPr lang="en-US" sz="1100" dirty="0"/>
-          </a:p>
-          <a:p>
-            <a:r>
-              <a:rPr lang="en-US" sz="1100" dirty="0"/>
-              <a:t>Moving forward, I used Spark to convert the compressed CSV files into the Parquet format.</a:t>
-            </a:r>
-          </a:p>
-          <a:p>
-            <a:endParaRPr lang="en-US" sz="1100" dirty="0"/>
-          </a:p>
-          <a:p>
-            <a:r>
-              <a:rPr lang="en-US" sz="1100" dirty="0"/>
-              <a:t>Finally, using Scala, I analyzed the data, and with Python's Pandas and Matplotlib libraries, I created charts that clearly depict the insights I've gleaned.</a:t>
-            </a:r>
-          </a:p>
-          <a:p>
-            <a:endParaRPr lang="en-US" sz="1100" dirty="0"/>
-          </a:p>
-          <a:p>
-            <a:r>
-              <a:rPr lang="en-US" sz="1100" dirty="0"/>
-              <a:t>Each step was pivotal in transforming the data to successfully complete the project.</a:t>
-            </a:r>
-          </a:p>
-          <a:p>
-            <a:endParaRPr lang="en-US" sz="1100" dirty="0"/>
-          </a:p>
-          <a:p>
-            <a:r>
-              <a:rPr lang="en-US" sz="1100" dirty="0"/>
-              <a:t>80’’</a:t>
-            </a:r>
-            <a:endParaRPr lang="pl-PL" sz="1100" dirty="0"/>
+              <a:rPr lang="en-US" sz="1050" dirty="0"/>
+              <a:t>Let's examine the structured steps I followed using a Modern Data Platform to process and analyze our air quality data. This framework is designed to handle large-scale data efficiently and effectively.</a:t>
+            </a:r>
+          </a:p>
+          <a:p>
+            <a:endParaRPr lang="en-US" sz="1050" dirty="0"/>
+          </a:p>
+          <a:p>
+            <a:r>
+              <a:rPr lang="en-US" sz="1050" dirty="0"/>
+              <a:t>Step 1: Begins with the extraction of data from the API. I created a Python application </a:t>
+            </a:r>
+            <a:r>
+              <a:rPr lang="en-US" sz="1050" dirty="0" err="1"/>
+              <a:t>adn</a:t>
+            </a:r>
+            <a:r>
+              <a:rPr lang="en-US" sz="1050" dirty="0"/>
+              <a:t> deployed it on Azure. Here, I also copy CSV files for subsequent enrichment.</a:t>
+            </a:r>
+          </a:p>
+          <a:p>
+            <a:endParaRPr lang="en-US" sz="1050" dirty="0"/>
+          </a:p>
+          <a:p>
+            <a:r>
+              <a:rPr lang="en-US" sz="1050" dirty="0"/>
+              <a:t>Step 2: Involves streaming this data through a Kafka producer, in fact connecting with Azure Event Hubs.</a:t>
+            </a:r>
+          </a:p>
+          <a:p>
+            <a:endParaRPr lang="en-US" sz="1050" dirty="0"/>
+          </a:p>
+          <a:p>
+            <a:r>
+              <a:rPr lang="en-US" sz="1050" dirty="0"/>
+              <a:t>Step 3: The streamed data is then saved to a Delta table. the CSV files are stored to the Databricks File System.</a:t>
+            </a:r>
+          </a:p>
+          <a:p>
+            <a:endParaRPr lang="en-US" sz="1050" dirty="0"/>
+          </a:p>
+          <a:p>
+            <a:r>
+              <a:rPr lang="en-US" sz="1050" dirty="0"/>
+              <a:t>Step 4: Utilizing Apache Spark, the data is converted to adhere to proper schemas, and a cleaning process is performed to ensure the quality of our data.</a:t>
+            </a:r>
+          </a:p>
+          <a:p>
+            <a:endParaRPr lang="en-US" sz="1050" dirty="0"/>
+          </a:p>
+          <a:p>
+            <a:r>
+              <a:rPr lang="en-US" sz="1050" dirty="0"/>
+              <a:t>Step 5: The cleaned data undergoes a series of analytical processes in Spark — this includes sorting, aggregating, and determining coefficients that are vital for our study.</a:t>
+            </a:r>
+          </a:p>
+          <a:p>
+            <a:endParaRPr lang="en-US" sz="1050" dirty="0"/>
+          </a:p>
+          <a:p>
+            <a:r>
+              <a:rPr lang="en-US" sz="1050" dirty="0"/>
+              <a:t>Step 6: Finally, the processed data is stored in an Azure SQL Database. The results are then displayed using visualizations and maps in an Azure App Service  application (the same that extracts and sends data), enabling us to interact with the data and extract meaningful insights.</a:t>
+            </a:r>
+          </a:p>
+          <a:p>
+            <a:endParaRPr lang="en-US" sz="1050" dirty="0"/>
+          </a:p>
+          <a:p>
+            <a:r>
+              <a:rPr lang="en-US" sz="1050" dirty="0"/>
+              <a:t>This six-step process represents the pipeline of transforming raw data into actionable knowledge, ensuring that every stage adds value and brings us closer to understanding air pollution patterns in Europe.</a:t>
+            </a:r>
+          </a:p>
+          <a:p>
+            <a:r>
+              <a:rPr lang="en-US" sz="1050" dirty="0"/>
+              <a:t>81</a:t>
+            </a:r>
+            <a:endParaRPr lang="pl-PL" sz="1050" dirty="0"/>
           </a:p>
         </p:txBody>
       </p:sp>
@@ -7430,7 +7412,7 @@
             <a:pPr algn="just"/>
             <a:r>
               <a:rPr lang="en-US" dirty="0"/>
-              <a:t>In this slide, I'm detailing the efficient process of exporting data from SQL Server to CSV and then compressing it for optimal transfer speed.</a:t>
+              <a:t>In the 'Ingest' phase of the data platform, I initiate the collection and integration of data necessary for my air pollution analysis. The process unfolds as follows:</a:t>
             </a:r>
           </a:p>
           <a:p>
@@ -7441,7 +7423,7 @@
             <a:pPr algn="just"/>
             <a:r>
               <a:rPr lang="en-US" dirty="0"/>
-              <a:t>I start by using BCP, which stands for Bulk Copy Program, a tool provided by SQL Server. It's the fastest method available to perform large-scale data exports to CSV format, ensuring speed and efficiency. I specify the view names that form the collection of data I wish to export, and then I initiate a loop to process each view individually.</a:t>
+              <a:t>A Python Flask application has been deployed on Azure, serving as the backbone of our data collection mechanism.</a:t>
             </a:r>
           </a:p>
           <a:p>
@@ -7452,31 +7434,7 @@
             <a:pPr algn="just"/>
             <a:r>
               <a:rPr lang="en-US" dirty="0"/>
-              <a:t>Once the CSV files are generated, I use 7-Zip to compress them into </a:t>
-            </a:r>
-            <a:r>
-              <a:rPr lang="en-US" dirty="0" err="1"/>
-              <a:t>gzip</a:t>
-            </a:r>
-            <a:r>
-              <a:rPr lang="en-US" dirty="0"/>
-              <a:t> format. One of the key advantages of </a:t>
-            </a:r>
-            <a:r>
-              <a:rPr lang="en-US" dirty="0" err="1"/>
-              <a:t>gzip</a:t>
-            </a:r>
-            <a:r>
-              <a:rPr lang="en-US" dirty="0"/>
-              <a:t> is its compatibility with Databricks' file system. It can read </a:t>
-            </a:r>
-            <a:r>
-              <a:rPr lang="en-US" dirty="0" err="1"/>
-              <a:t>gzip</a:t>
-            </a:r>
-            <a:r>
-              <a:rPr lang="en-US" dirty="0"/>
-              <a:t> files directly, which means there's no need to decompress them on the platform, saving valuable processing time and simplifying the data pipeline.</a:t>
+              <a:t>This application is scheduled to regularly fetch data from the Open Weather API, sweeping through the geographical coordinates of Europe to collect a comprehensive dataset.</a:t>
             </a:r>
           </a:p>
           <a:p>
@@ -7487,7 +7445,23 @@
             <a:pPr algn="just"/>
             <a:r>
               <a:rPr lang="en-US" dirty="0"/>
-              <a:t>The bottom part of the slide shows the actual script that orchestrates this entire process: from setting environment variables for BCP to executing the compression commands and cleaning up interim files. This script is the backbone of the procedure, handling everything from data extraction to final file compression, ready for sending to Databricks.</a:t>
+              <a:t>Additionally, CSV files containing the coordinates of capital cities and the ISO country codes are downloaded from the Internet. These files are needed to </a:t>
+            </a:r>
+            <a:r>
+              <a:rPr lang="en-US" dirty="0" err="1"/>
+              <a:t>diplay</a:t>
+            </a:r>
+            <a:r>
+              <a:rPr lang="en-US" dirty="0"/>
+              <a:t> the </a:t>
+            </a:r>
+            <a:r>
+              <a:rPr lang="en-US" dirty="0" err="1"/>
+              <a:t>meaningfull</a:t>
+            </a:r>
+            <a:r>
+              <a:rPr lang="en-US" dirty="0"/>
+              <a:t> names.</a:t>
             </a:r>
           </a:p>
           <a:p>
@@ -7498,7 +7472,14 @@
             <a:pPr algn="just"/>
             <a:r>
               <a:rPr lang="en-US" dirty="0"/>
-              <a:t>67’’</a:t>
+              <a:t>These collected datasets are then prepared for the streaming phase. </a:t>
+            </a:r>
+          </a:p>
+          <a:p>
+            <a:pPr algn="just"/>
+            <a:r>
+              <a:rPr lang="en-US" dirty="0"/>
+              <a:t>45’’</a:t>
             </a:r>
             <a:endParaRPr lang="pl-PL" dirty="0"/>
           </a:p>
@@ -7677,26 +7658,14 @@
             <a:pPr algn="just"/>
             <a:r>
               <a:rPr lang="en-US" sz="1000" dirty="0"/>
-              <a:t>The result, which you can see on the right, is the list of files successfully copied to Databricks. These are the </a:t>
-            </a:r>
-            <a:r>
-              <a:rPr lang="en-US" sz="1000" dirty="0" err="1"/>
-              <a:t>gzipped</a:t>
-            </a:r>
+              <a:t>The result, which you can see on the right, is the list of files successfully copied to Databricks. </a:t>
+            </a:r>
+          </a:p>
+          <a:p>
+            <a:pPr algn="just"/>
             <a:r>
               <a:rPr lang="en-US" sz="1000" dirty="0"/>
-              <a:t> CSV files now stored in the Databricks file system, ready to be used for further conversion and data analysis.</a:t>
-            </a:r>
-          </a:p>
-          <a:p>
-            <a:pPr algn="just"/>
-            <a:endParaRPr lang="en-US" sz="1000" dirty="0"/>
-          </a:p>
-          <a:p>
-            <a:pPr algn="just"/>
-            <a:r>
-              <a:rPr lang="en-US" sz="1000" dirty="0"/>
-              <a:t>84’’</a:t>
+              <a:t>80’’</a:t>
             </a:r>
             <a:endParaRPr lang="pl-PL" sz="1000" dirty="0"/>
           </a:p>
@@ -7810,7 +7779,7 @@
             <a:pPr algn="just"/>
             <a:r>
               <a:rPr lang="en-US" dirty="0"/>
-              <a:t>In this slide, I'm detailing the efficient process of exporting data from SQL Server to CSV and then compressing it for optimal transfer speed.</a:t>
+              <a:t>In the streaming stage, I handle the real-time flow of data. The core components of this stage are:</a:t>
             </a:r>
           </a:p>
           <a:p>
@@ -7821,7 +7790,14 @@
             <a:pPr algn="just"/>
             <a:r>
               <a:rPr lang="en-US" dirty="0"/>
-              <a:t>I start by using BCP, which stands for Bulk Copy Program, a tool provided by SQL Server. It's the fastest method available to perform large-scale data exports to CSV format, ensuring speed and efficiency. I specify the view names that form the collection of data I wish to export, and then I initiate a loop to process each view individually.</a:t>
+              <a:t>A Kafka producer, which is a Python application I wrote, using proper libraries. It's responsible for sending the raw data at regular intervals to Azure Event Hubs.</a:t>
+            </a:r>
+          </a:p>
+          <a:p>
+            <a:pPr algn="just"/>
+            <a:r>
+              <a:rPr lang="en-US" dirty="0"/>
+              <a:t>To manage this process, I've set up a scheduler and the application's simple logging system, all of which run on the same Azure Flask application.</a:t>
             </a:r>
           </a:p>
           <a:p>
@@ -7832,31 +7808,7 @@
             <a:pPr algn="just"/>
             <a:r>
               <a:rPr lang="en-US" dirty="0"/>
-              <a:t>Once the CSV files are generated, I use 7-Zip to compress them into </a:t>
-            </a:r>
-            <a:r>
-              <a:rPr lang="en-US" dirty="0" err="1"/>
-              <a:t>gzip</a:t>
-            </a:r>
-            <a:r>
-              <a:rPr lang="en-US" dirty="0"/>
-              <a:t> format. One of the key advantages of </a:t>
-            </a:r>
-            <a:r>
-              <a:rPr lang="en-US" dirty="0" err="1"/>
-              <a:t>gzip</a:t>
-            </a:r>
-            <a:r>
-              <a:rPr lang="en-US" dirty="0"/>
-              <a:t> is its compatibility with Databricks' file system. It can read </a:t>
-            </a:r>
-            <a:r>
-              <a:rPr lang="en-US" dirty="0" err="1"/>
-              <a:t>gzip</a:t>
-            </a:r>
-            <a:r>
-              <a:rPr lang="en-US" dirty="0"/>
-              <a:t> files directly, which means there's no need to decompress them on the platform, saving valuable processing time and simplifying the data pipeline.</a:t>
+              <a:t>The logs on display here show the Kafka producer in action, indicating the timestamps and counts of messages sent. It demonstrates the system's continuous operation.</a:t>
             </a:r>
           </a:p>
           <a:p>
@@ -7867,18 +7819,21 @@
             <a:pPr algn="just"/>
             <a:r>
               <a:rPr lang="en-US" dirty="0"/>
-              <a:t>The bottom part of the slide shows the actual script that orchestrates this entire process: from setting environment variables for BCP to executing the compression commands and cleaning up interim files. This script is the backbone of the procedure, handling everything from data extraction to final file compression, ready for sending to Databricks.</a:t>
+              <a:t>The second critical component is a Kafka consumer, which I've implemented on Azure Databricks. This consumer processes the incoming data stream, making it ready for analysis and storage.</a:t>
             </a:r>
           </a:p>
           <a:p>
             <a:pPr algn="just"/>
-            <a:endParaRPr lang="en-US" dirty="0"/>
+            <a:r>
+              <a:rPr lang="en-US" dirty="0"/>
+              <a:t>This slide provides the configuration code for the Kafka consumer, illustrating how we connect and configure the data consumer within the architecture.</a:t>
+            </a:r>
           </a:p>
           <a:p>
             <a:pPr algn="just"/>
             <a:r>
               <a:rPr lang="en-US" dirty="0"/>
-              <a:t>67’’</a:t>
+              <a:t>54’’</a:t>
             </a:r>
             <a:endParaRPr lang="pl-PL" dirty="0"/>
           </a:p>
@@ -7992,7 +7947,7 @@
             <a:pPr algn="just"/>
             <a:r>
               <a:rPr lang="en-US" dirty="0"/>
-              <a:t>In this slide, I'm detailing the efficient process of exporting data from SQL Server to CSV and then compressing it for optimal transfer speed.</a:t>
+              <a:t>Continuing with the streaming stage, let’s focus on how the data is handled within Spark. The two main tasks at this point are:</a:t>
             </a:r>
           </a:p>
           <a:p>
@@ -8003,7 +7958,7 @@
             <a:pPr algn="just"/>
             <a:r>
               <a:rPr lang="en-US" dirty="0"/>
-              <a:t>I start by using BCP, which stands for Bulk Copy Program, a tool provided by SQL Server. It's the fastest method available to perform large-scale data exports to CSV format, ensuring speed and efficiency. I specify the view names that form the collection of data I wish to export, and then I initiate a loop to process each view individually.</a:t>
+              <a:t>Reading the stream from the beginning, ensuring no data is missed and that we have the full picture of the air quality over time.</a:t>
             </a:r>
           </a:p>
           <a:p>
@@ -8014,31 +7969,7 @@
             <a:pPr algn="just"/>
             <a:r>
               <a:rPr lang="en-US" dirty="0"/>
-              <a:t>Once the CSV files are generated, I use 7-Zip to compress them into </a:t>
-            </a:r>
-            <a:r>
-              <a:rPr lang="en-US" dirty="0" err="1"/>
-              <a:t>gzip</a:t>
-            </a:r>
-            <a:r>
-              <a:rPr lang="en-US" dirty="0"/>
-              <a:t> format. One of the key advantages of </a:t>
-            </a:r>
-            <a:r>
-              <a:rPr lang="en-US" dirty="0" err="1"/>
-              <a:t>gzip</a:t>
-            </a:r>
-            <a:r>
-              <a:rPr lang="en-US" dirty="0"/>
-              <a:t> is its compatibility with Databricks' file system. It can read </a:t>
-            </a:r>
-            <a:r>
-              <a:rPr lang="en-US" dirty="0" err="1"/>
-              <a:t>gzip</a:t>
-            </a:r>
-            <a:r>
-              <a:rPr lang="en-US" dirty="0"/>
-              <a:t> files directly, which means there's no need to decompress them on the platform, saving valuable processing time and simplifying the data pipeline.</a:t>
+              <a:t>Converting the key and value in the Kafka stream to strings to standardize the data format for subsequent processing.</a:t>
             </a:r>
           </a:p>
           <a:p>
@@ -8049,7 +7980,7 @@
             <a:pPr algn="just"/>
             <a:r>
               <a:rPr lang="en-US" dirty="0"/>
-              <a:t>The bottom part of the slide shows the actual script that orchestrates this entire process: from setting environment variables for BCP to executing the compression commands and cleaning up interim files. This script is the backbone of the procedure, handling everything from data extraction to final file compression, ready for sending to Databricks.</a:t>
+              <a:t>On this slide, you see a snippet of the actual code used in the streaming process. </a:t>
             </a:r>
           </a:p>
           <a:p>
@@ -8060,7 +7991,22 @@
             <a:pPr algn="just"/>
             <a:r>
               <a:rPr lang="en-US" dirty="0"/>
-              <a:t>67’’</a:t>
+              <a:t>It sets the options for the Kafka stream, including the servers, security protocol, and subscription details. The '</a:t>
+            </a:r>
+            <a:r>
+              <a:rPr lang="en-US" dirty="0" err="1"/>
+              <a:t>startingOffsets</a:t>
+            </a:r>
+            <a:r>
+              <a:rPr lang="en-US" dirty="0"/>
+              <a:t>' is set to 'earliest', which tells Spark to begin processing records from the earliest available in Kafka.</a:t>
+            </a:r>
+          </a:p>
+          <a:p>
+            <a:pPr algn="just"/>
+            <a:r>
+              <a:rPr lang="en-US" dirty="0"/>
+              <a:t>44’’</a:t>
             </a:r>
             <a:endParaRPr lang="pl-PL" dirty="0"/>
           </a:p>
@@ -8174,7 +8120,7 @@
             <a:pPr algn="just"/>
             <a:r>
               <a:rPr lang="en-US" dirty="0"/>
-              <a:t>In this slide, I'm detailing the efficient process of exporting data from SQL Server to CSV and then compressing it for optimal transfer speed.</a:t>
+              <a:t>Now, we arrive at the 'Processing' phase, where defining precise schemas for the  data is essential. </a:t>
             </a:r>
           </a:p>
           <a:p>
@@ -8185,7 +8131,7 @@
             <a:pPr algn="just"/>
             <a:r>
               <a:rPr lang="en-US" dirty="0"/>
-              <a:t>I start by using BCP, which stands for Bulk Copy Program, a tool provided by SQL Server. It's the fastest method available to perform large-scale data exports to CSV format, ensuring speed and efficiency. I specify the view names that form the collection of data I wish to export, and then I initiate a loop to process each view individually.</a:t>
+              <a:t>Schemas are blueprints that describe the structure of the data we expect in the system. They enable Spark to parse and process data in a consistent and optimized manner.</a:t>
             </a:r>
           </a:p>
           <a:p>
@@ -8194,33 +8140,13 @@
           </a:p>
           <a:p>
             <a:pPr algn="just"/>
+            <a:endParaRPr lang="en-US" dirty="0"/>
+          </a:p>
+          <a:p>
+            <a:pPr algn="just"/>
             <a:r>
               <a:rPr lang="en-US" dirty="0"/>
-              <a:t>Once the CSV files are generated, I use 7-Zip to compress them into </a:t>
-            </a:r>
-            <a:r>
-              <a:rPr lang="en-US" dirty="0" err="1"/>
-              <a:t>gzip</a:t>
-            </a:r>
-            <a:r>
-              <a:rPr lang="en-US" dirty="0"/>
-              <a:t> format. One of the key advantages of </a:t>
-            </a:r>
-            <a:r>
-              <a:rPr lang="en-US" dirty="0" err="1"/>
-              <a:t>gzip</a:t>
-            </a:r>
-            <a:r>
-              <a:rPr lang="en-US" dirty="0"/>
-              <a:t> is its compatibility with Databricks' file system. It can read </a:t>
-            </a:r>
-            <a:r>
-              <a:rPr lang="en-US" dirty="0" err="1"/>
-              <a:t>gzip</a:t>
-            </a:r>
-            <a:r>
-              <a:rPr lang="en-US" dirty="0"/>
-              <a:t> files directly, which means there's no need to decompress them on the platform, saving valuable processing time and simplifying the data pipeline.</a:t>
+              <a:t>It's important to note that the schema shown is not complete due to its length, but it gives an insight into how I prepared my data for reliable analysis.</a:t>
             </a:r>
           </a:p>
           <a:p>
@@ -8231,18 +8157,7 @@
             <a:pPr algn="just"/>
             <a:r>
               <a:rPr lang="en-US" dirty="0"/>
-              <a:t>The bottom part of the slide shows the actual script that orchestrates this entire process: from setting environment variables for BCP to executing the compression commands and cleaning up interim files. This script is the backbone of the procedure, handling everything from data extraction to final file compression, ready for sending to Databricks.</a:t>
-            </a:r>
-          </a:p>
-          <a:p>
-            <a:pPr algn="just"/>
-            <a:endParaRPr lang="en-US" dirty="0"/>
-          </a:p>
-          <a:p>
-            <a:pPr algn="just"/>
-            <a:r>
-              <a:rPr lang="en-US" dirty="0"/>
-              <a:t>67’’</a:t>
+              <a:t>28’’</a:t>
             </a:r>
             <a:endParaRPr lang="pl-PL" dirty="0"/>
           </a:p>
@@ -14516,11 +14431,6 @@
               </a:rPr>
               <a:t>The use of a Modern Data Platform has revealed that the most polluted air is in Southern Europe.</a:t>
             </a:r>
-            <a:endParaRPr lang="pl-PL" sz="1600" dirty="0">
-              <a:solidFill>
-                <a:schemeClr val="tx1"/>
-              </a:solidFill>
-            </a:endParaRPr>
           </a:p>
           <a:p>
             <a:pPr marL="342900" indent="-342900" rtl="0">
@@ -14536,7 +14446,7 @@
                   <a:schemeClr val="tx1"/>
                 </a:solidFill>
               </a:rPr>
-              <a:t>The analyses conducted were limited to only a portion of the processed data, so the results could be more diverse and interesting.</a:t>
+              <a:t>Data Processing in Spark was very fast and efficient.</a:t>
             </a:r>
             <a:endParaRPr lang="pl-PL" sz="1600" dirty="0">
               <a:solidFill>
@@ -14558,8 +14468,13 @@
                   <a:schemeClr val="tx1"/>
                 </a:solidFill>
               </a:rPr>
-              <a:t>More information would be provided by comparing current data with historical data.</a:t>
-            </a:r>
+              <a:t>The analyses conducted were limited to only a portion of the processed data, so the results could be more diverse and interesting.</a:t>
+            </a:r>
+            <a:endParaRPr lang="pl-PL" sz="1600" dirty="0">
+              <a:solidFill>
+                <a:schemeClr val="tx1"/>
+              </a:solidFill>
+            </a:endParaRPr>
           </a:p>
           <a:p>
             <a:pPr marL="342900" indent="-342900" rtl="0">
@@ -14575,7 +14490,24 @@
                   <a:schemeClr val="tx1"/>
                 </a:solidFill>
               </a:rPr>
-              <a:t>The presentation may look more professional with the use of specialized tools like Tableau.</a:t>
+              <a:t>More information would be provided by comparing current data with historical data.</a:t>
+            </a:r>
+          </a:p>
+          <a:p>
+            <a:pPr marL="342900" indent="-342900" rtl="0">
+              <a:spcAft>
+                <a:spcPts val="1200"/>
+              </a:spcAft>
+              <a:buFont typeface="+mj-lt"/>
+              <a:buAutoNum type="arabicPeriod"/>
+            </a:pPr>
+            <a:r>
+              <a:rPr lang="en-US" sz="1600" dirty="0">
+                <a:solidFill>
+                  <a:schemeClr val="tx1"/>
+                </a:solidFill>
+              </a:rPr>
+              <a:t>Specialized tools like Tableau can elevate the analysis.</a:t>
             </a:r>
             <a:endParaRPr lang="pl-PL" sz="1600" dirty="0">
               <a:solidFill>
@@ -19335,6 +19267,15 @@
 </file>
 
 <file path=customXml/item1.xml><?xml version="1.0" encoding="utf-8"?>
+<?mso-contentType ?>
+<FormTemplates xmlns="http://schemas.microsoft.com/sharepoint/v3/contenttype/forms">
+  <Display>DocumentLibraryForm</Display>
+  <Edit>DocumentLibraryForm</Edit>
+  <New>DocumentLibraryForm</New>
+</FormTemplates>
+</file>
+
+<file path=customXml/item2.xml><?xml version="1.0" encoding="utf-8"?>
 <ct:contentTypeSchema xmlns:ct="http://schemas.microsoft.com/office/2006/metadata/contentType" xmlns:ma="http://schemas.microsoft.com/office/2006/metadata/properties/metaAttributes" ct:_="" ma:_="" ma:contentTypeName="Document" ma:contentTypeID="0x01010079F111ED35F8CC479449609E8A0923A6" ma:contentTypeVersion="20" ma:contentTypeDescription="Create a new document." ma:contentTypeScope="" ma:versionID="1267097ee5f5874adfcc408041ae252e">
   <xsd:schema xmlns:xsd="http://www.w3.org/2001/XMLSchema" xmlns:xs="http://www.w3.org/2001/XMLSchema" xmlns:p="http://schemas.microsoft.com/office/2006/metadata/properties" xmlns:ns1="http://schemas.microsoft.com/sharepoint/v3" xmlns:ns2="71af3243-3dd4-4a8d-8c0d-dd76da1f02a5" xmlns:ns3="16c05727-aa75-4e4a-9b5f-8a80a1165891" xmlns:ns4="230e9df3-be65-4c73-a93b-d1236ebd677e" targetNamespace="http://schemas.microsoft.com/office/2006/metadata/properties" ma:root="true" ma:fieldsID="395891a93df65b14727750f2c06c306c" ns1:_="" ns2:_="" ns3:_="" ns4:_="">
     <xsd:import namespace="http://schemas.microsoft.com/sharepoint/v3"/>
@@ -19610,15 +19551,6 @@
 </ct:contentTypeSchema>
 </file>
 
-<file path=customXml/item2.xml><?xml version="1.0" encoding="utf-8"?>
-<?mso-contentType ?>
-<FormTemplates xmlns="http://schemas.microsoft.com/sharepoint/v3/contenttype/forms">
-  <Display>DocumentLibraryForm</Display>
-  <Edit>DocumentLibraryForm</Edit>
-  <New>DocumentLibraryForm</New>
-</FormTemplates>
-</file>
-
 <file path=customXml/item3.xml><?xml version="1.0" encoding="utf-8"?>
 <p:properties xmlns:p="http://schemas.microsoft.com/office/2006/metadata/properties" xmlns:xsi="http://www.w3.org/2001/XMLSchema-instance" xmlns:pc="http://schemas.microsoft.com/office/infopath/2007/PartnerControls">
   <documentManagement>
@@ -19639,6 +19571,14 @@
 </file>
 
 <file path=customXml/itemProps1.xml><?xml version="1.0" encoding="utf-8"?>
+<ds:datastoreItem xmlns:ds="http://schemas.openxmlformats.org/officeDocument/2006/customXml" ds:itemID="{77DD0DBF-30B2-4FC6-A5E7-8374DC718037}">
+  <ds:schemaRefs>
+    <ds:schemaRef ds:uri="http://schemas.microsoft.com/sharepoint/v3/contenttype/forms"/>
+  </ds:schemaRefs>
+</ds:datastoreItem>
+</file>
+
+<file path=customXml/itemProps2.xml><?xml version="1.0" encoding="utf-8"?>
 <ds:datastoreItem xmlns:ds="http://schemas.openxmlformats.org/officeDocument/2006/customXml" ds:itemID="{B2A44EB6-3BD3-4FF9-B8D1-D973C54C3ED7}">
   <ds:schemaRefs>
     <ds:schemaRef ds:uri="http://schemas.microsoft.com/office/2006/metadata/contentType"/>
@@ -19655,14 +19595,6 @@
     <ds:schemaRef ds:uri="http://purl.org/dc/elements/1.1/"/>
     <ds:schemaRef ds:uri="http://purl.org/dc/terms/"/>
     <ds:schemaRef ds:uri="http://schemas.microsoft.com/internal/obd"/>
-  </ds:schemaRefs>
-</ds:datastoreItem>
-</file>
-
-<file path=customXml/itemProps2.xml><?xml version="1.0" encoding="utf-8"?>
-<ds:datastoreItem xmlns:ds="http://schemas.openxmlformats.org/officeDocument/2006/customXml" ds:itemID="{77DD0DBF-30B2-4FC6-A5E7-8374DC718037}">
-  <ds:schemaRefs>
-    <ds:schemaRef ds:uri="http://schemas.microsoft.com/sharepoint/v3/contenttype/forms"/>
   </ds:schemaRefs>
 </ds:datastoreItem>
 </file>

</xml_diff>